<commit_message>
Lab 7: Added message about anode vs cathod
</commit_message>
<xml_diff>
--- a/Lab 7/CS 341 Lab 7.pptx
+++ b/Lab 7/CS 341 Lab 7.pptx
@@ -5255,7 +5255,9 @@
           </a:xfrm>
         </p:spPr>
         <p:txBody>
-          <a:bodyPr/>
+          <a:bodyPr>
+            <a:normAutofit/>
+          </a:bodyPr>
           <a:lstStyle/>
           <a:p>
             <a:pPr>
@@ -5280,6 +5282,91 @@
               </a:rPr>
               <a:t> Create a counter that starts at 0, and counts up to 9, it should then loop back to 0</a:t>
             </a:r>
+          </a:p>
+          <a:p>
+            <a:pPr>
+              <a:buFont typeface="Wingdings" panose="05000000000000000000" pitchFamily="2" charset="2"/>
+              <a:buChar char="§"/>
+            </a:pPr>
+            <a:endParaRPr lang="en-US" sz="1800" dirty="0">
+              <a:latin typeface="Calibri" panose="020F0502020204030204" pitchFamily="34" charset="0"/>
+              <a:ea typeface="Calibri" panose="020F0502020204030204" pitchFamily="34" charset="0"/>
+            </a:endParaRPr>
+          </a:p>
+          <a:p>
+            <a:pPr>
+              <a:buFont typeface="Wingdings" panose="05000000000000000000" pitchFamily="2" charset="2"/>
+              <a:buChar char="§"/>
+            </a:pPr>
+            <a:endParaRPr lang="en-US" sz="1800" dirty="0">
+              <a:latin typeface="Calibri" panose="020F0502020204030204" pitchFamily="34" charset="0"/>
+              <a:ea typeface="Calibri" panose="020F0502020204030204" pitchFamily="34" charset="0"/>
+            </a:endParaRPr>
+          </a:p>
+          <a:p>
+            <a:pPr>
+              <a:buFont typeface="Wingdings" panose="05000000000000000000" pitchFamily="2" charset="2"/>
+              <a:buChar char="§"/>
+            </a:pPr>
+            <a:endParaRPr lang="en-US" sz="1800" dirty="0">
+              <a:latin typeface="Calibri" panose="020F0502020204030204" pitchFamily="34" charset="0"/>
+              <a:ea typeface="Calibri" panose="020F0502020204030204" pitchFamily="34" charset="0"/>
+            </a:endParaRPr>
+          </a:p>
+          <a:p>
+            <a:pPr>
+              <a:buFont typeface="Wingdings" panose="05000000000000000000" pitchFamily="2" charset="2"/>
+              <a:buChar char="§"/>
+            </a:pPr>
+            <a:endParaRPr lang="en-US" sz="1800" dirty="0">
+              <a:latin typeface="Calibri" panose="020F0502020204030204" pitchFamily="34" charset="0"/>
+              <a:ea typeface="Calibri" panose="020F0502020204030204" pitchFamily="34" charset="0"/>
+            </a:endParaRPr>
+          </a:p>
+          <a:p>
+            <a:pPr>
+              <a:buFont typeface="Wingdings" panose="05000000000000000000" pitchFamily="2" charset="2"/>
+              <a:buChar char="§"/>
+            </a:pPr>
+            <a:endParaRPr lang="en-US" sz="1800" dirty="0">
+              <a:latin typeface="Calibri" panose="020F0502020204030204" pitchFamily="34" charset="0"/>
+              <a:ea typeface="Calibri" panose="020F0502020204030204" pitchFamily="34" charset="0"/>
+            </a:endParaRPr>
+          </a:p>
+          <a:p>
+            <a:pPr marL="0" indent="0">
+              <a:buNone/>
+            </a:pPr>
+            <a:endParaRPr lang="en-US" sz="1800" dirty="0">
+              <a:latin typeface="Calibri" panose="020F0502020204030204" pitchFamily="34" charset="0"/>
+              <a:ea typeface="Calibri" panose="020F0502020204030204" pitchFamily="34" charset="0"/>
+            </a:endParaRPr>
+          </a:p>
+          <a:p>
+            <a:pPr>
+              <a:buFont typeface="Wingdings" panose="05000000000000000000" pitchFamily="2" charset="2"/>
+              <a:buChar char="§"/>
+            </a:pPr>
+            <a:r>
+              <a:rPr lang="en-US" sz="1800" dirty="0">
+                <a:effectLst/>
+                <a:latin typeface="Calibri" panose="020F0502020204030204" pitchFamily="34" charset="0"/>
+                <a:ea typeface="Calibri" panose="020F0502020204030204" pitchFamily="34" charset="0"/>
+              </a:rPr>
+              <a:t> Note: make sure the 7 segment displa</a:t>
+            </a:r>
+            <a:r>
+              <a:rPr lang="en-US" sz="1800" dirty="0">
+                <a:latin typeface="Calibri" panose="020F0502020204030204" pitchFamily="34" charset="0"/>
+                <a:ea typeface="Calibri" panose="020F0502020204030204" pitchFamily="34" charset="0"/>
+              </a:rPr>
+              <a:t>y is set to cathode, not anode</a:t>
+            </a:r>
+            <a:endParaRPr lang="en-US" sz="1800" dirty="0">
+              <a:effectLst/>
+              <a:latin typeface="Calibri" panose="020F0502020204030204" pitchFamily="34" charset="0"/>
+              <a:ea typeface="Calibri" panose="020F0502020204030204" pitchFamily="34" charset="0"/>
+            </a:endParaRPr>
           </a:p>
         </p:txBody>
       </p:sp>

</xml_diff>